<commit_message>
Update Automatic traffic signalling system.pptx
</commit_message>
<xml_diff>
--- a/presentation/Automatic traffic signalling system.pptx
+++ b/presentation/Automatic traffic signalling system.pptx
@@ -3684,13 +3684,13 @@
               </a:spcBef>
             </a:pPr>
             <a:r>
-              <a:rPr lang="en-US" sz="3200">
+              <a:rPr lang="en-US" sz="3200" dirty="0">
                 <a:solidFill>
                   <a:srgbClr val="000000"/>
                 </a:solidFill>
                 <a:latin typeface="Roboto Bold"/>
               </a:rPr>
-              <a:t>Traffic systems will change the signals according to the traffic, for instance, instead of round-robin schedules.</a:t>
+              <a:t>Traffic systems will change the signals according to the traffic, for instance, instead of fixed round-robin schedules.</a:t>
             </a:r>
           </a:p>
         </p:txBody>
@@ -3725,7 +3725,7 @@
               </a:spcBef>
             </a:pPr>
             <a:r>
-              <a:rPr lang="en-US" sz="3199">
+              <a:rPr lang="en-US" sz="3199" dirty="0">
                 <a:solidFill>
                   <a:srgbClr val="000000"/>
                 </a:solidFill>

</xml_diff>